<commit_message>
Presentation and risk analysis update
</commit_message>
<xml_diff>
--- a/documents/presentations/Context extra.pptx
+++ b/documents/presentations/Context extra.pptx
@@ -113,6 +113,22 @@
       </a:defRPr>
     </a:lvl9pPr>
   </p:defaultTextStyle>
+  <p:extLst>
+    <p:ext uri="{EFAFB233-063F-42B5-8137-9DF3F51BA10A}">
+      <p15:sldGuideLst xmlns:p15="http://schemas.microsoft.com/office/powerpoint/2012/main">
+        <p15:guide id="1" orient="horz" pos="2160">
+          <p15:clr>
+            <a:srgbClr val="A4A3A4"/>
+          </p15:clr>
+        </p15:guide>
+        <p15:guide id="2" pos="2880">
+          <p15:clr>
+            <a:srgbClr val="A4A3A4"/>
+          </p15:clr>
+        </p15:guide>
+      </p15:sldGuideLst>
+    </p:ext>
+  </p:extLst>
 </p:presentation>
 </file>
 
@@ -198,7 +214,7 @@
           <a:p>
             <a:fld id="{D73245DF-9F8F-064F-BF1C-9FD6EE05B263}" type="datetimeFigureOut">
               <a:rPr lang="en-US" smtClean="0"/>
-              <a:t>21-01-20</a:t>
+              <a:t>2/2/2021</a:t>
             </a:fld>
             <a:endParaRPr lang="en-US"/>
           </a:p>
@@ -1139,7 +1155,7 @@
           <a:p>
             <a:fld id="{AA15B6E4-556E-2D41-A248-FB1CF72BCA18}" type="datetimeFigureOut">
               <a:rPr lang="en-US" smtClean="0"/>
-              <a:t>21-01-20</a:t>
+              <a:t>2/2/2021</a:t>
             </a:fld>
             <a:endParaRPr lang="en-US"/>
           </a:p>
@@ -1309,7 +1325,7 @@
           <a:p>
             <a:fld id="{AA15B6E4-556E-2D41-A248-FB1CF72BCA18}" type="datetimeFigureOut">
               <a:rPr lang="en-US" smtClean="0"/>
-              <a:t>21-01-20</a:t>
+              <a:t>2/2/2021</a:t>
             </a:fld>
             <a:endParaRPr lang="en-US"/>
           </a:p>
@@ -1489,7 +1505,7 @@
           <a:p>
             <a:fld id="{AA15B6E4-556E-2D41-A248-FB1CF72BCA18}" type="datetimeFigureOut">
               <a:rPr lang="en-US" smtClean="0"/>
-              <a:t>21-01-20</a:t>
+              <a:t>2/2/2021</a:t>
             </a:fld>
             <a:endParaRPr lang="en-US"/>
           </a:p>
@@ -1659,7 +1675,7 @@
           <a:p>
             <a:fld id="{AA15B6E4-556E-2D41-A248-FB1CF72BCA18}" type="datetimeFigureOut">
               <a:rPr lang="en-US" smtClean="0"/>
-              <a:t>21-01-20</a:t>
+              <a:t>2/2/2021</a:t>
             </a:fld>
             <a:endParaRPr lang="en-US"/>
           </a:p>
@@ -1905,7 +1921,7 @@
           <a:p>
             <a:fld id="{AA15B6E4-556E-2D41-A248-FB1CF72BCA18}" type="datetimeFigureOut">
               <a:rPr lang="en-US" smtClean="0"/>
-              <a:t>21-01-20</a:t>
+              <a:t>2/2/2021</a:t>
             </a:fld>
             <a:endParaRPr lang="en-US"/>
           </a:p>
@@ -2193,7 +2209,7 @@
           <a:p>
             <a:fld id="{AA15B6E4-556E-2D41-A248-FB1CF72BCA18}" type="datetimeFigureOut">
               <a:rPr lang="en-US" smtClean="0"/>
-              <a:t>21-01-20</a:t>
+              <a:t>2/2/2021</a:t>
             </a:fld>
             <a:endParaRPr lang="en-US"/>
           </a:p>
@@ -2615,7 +2631,7 @@
           <a:p>
             <a:fld id="{AA15B6E4-556E-2D41-A248-FB1CF72BCA18}" type="datetimeFigureOut">
               <a:rPr lang="en-US" smtClean="0"/>
-              <a:t>21-01-20</a:t>
+              <a:t>2/2/2021</a:t>
             </a:fld>
             <a:endParaRPr lang="en-US"/>
           </a:p>
@@ -2733,7 +2749,7 @@
           <a:p>
             <a:fld id="{AA15B6E4-556E-2D41-A248-FB1CF72BCA18}" type="datetimeFigureOut">
               <a:rPr lang="en-US" smtClean="0"/>
-              <a:t>21-01-20</a:t>
+              <a:t>2/2/2021</a:t>
             </a:fld>
             <a:endParaRPr lang="en-US"/>
           </a:p>
@@ -2828,7 +2844,7 @@
           <a:p>
             <a:fld id="{AA15B6E4-556E-2D41-A248-FB1CF72BCA18}" type="datetimeFigureOut">
               <a:rPr lang="en-US" smtClean="0"/>
-              <a:t>21-01-20</a:t>
+              <a:t>2/2/2021</a:t>
             </a:fld>
             <a:endParaRPr lang="en-US"/>
           </a:p>
@@ -3105,7 +3121,7 @@
           <a:p>
             <a:fld id="{AA15B6E4-556E-2D41-A248-FB1CF72BCA18}" type="datetimeFigureOut">
               <a:rPr lang="en-US" smtClean="0"/>
-              <a:t>21-01-20</a:t>
+              <a:t>2/2/2021</a:t>
             </a:fld>
             <a:endParaRPr lang="en-US"/>
           </a:p>
@@ -3358,7 +3374,7 @@
           <a:p>
             <a:fld id="{AA15B6E4-556E-2D41-A248-FB1CF72BCA18}" type="datetimeFigureOut">
               <a:rPr lang="en-US" smtClean="0"/>
-              <a:t>21-01-20</a:t>
+              <a:t>2/2/2021</a:t>
             </a:fld>
             <a:endParaRPr lang="en-US"/>
           </a:p>
@@ -3571,7 +3587,7 @@
           <a:p>
             <a:fld id="{AA15B6E4-556E-2D41-A248-FB1CF72BCA18}" type="datetimeFigureOut">
               <a:rPr lang="en-US" smtClean="0"/>
-              <a:t>21-01-20</a:t>
+              <a:t>2/2/2021</a:t>
             </a:fld>
             <a:endParaRPr lang="en-US"/>
           </a:p>
@@ -4842,7 +4858,7 @@
         </p:spPr>
         <p:txBody>
           <a:bodyPr>
-            <a:normAutofit fontScale="92500"/>
+            <a:normAutofit/>
           </a:bodyPr>
           <a:lstStyle/>
           <a:p>
@@ -5107,16 +5123,16 @@
         </p:spPr>
         <p:txBody>
           <a:bodyPr>
-            <a:normAutofit fontScale="90000"/>
+            <a:normAutofit/>
           </a:bodyPr>
           <a:lstStyle/>
           <a:p>
             <a:pPr algn="l"/>
             <a:r>
-              <a:rPr lang="en-US" b="1" dirty="0" smtClean="0"/>
+              <a:rPr lang="en-US" sz="3200" b="1" dirty="0" smtClean="0"/>
               <a:t>Fishery Management Objectives:</a:t>
             </a:r>
-            <a:endParaRPr lang="en-US" b="1" dirty="0"/>
+            <a:endParaRPr lang="en-US" sz="3200" b="1" dirty="0"/>
           </a:p>
         </p:txBody>
       </p:sp>
@@ -5137,50 +5153,76 @@
           </a:xfrm>
         </p:spPr>
         <p:txBody>
-          <a:bodyPr/>
-          <a:lstStyle/>
-          <a:p>
-            <a:r>
-              <a:rPr lang="en-US" dirty="0" smtClean="0"/>
+          <a:bodyPr>
+            <a:normAutofit/>
+          </a:bodyPr>
+          <a:lstStyle/>
+          <a:p>
+            <a:r>
+              <a:rPr lang="en-US" sz="2800" dirty="0" smtClean="0"/>
               <a:t>Maximize </a:t>
             </a:r>
             <a:r>
-              <a:rPr lang="en-US" b="1" dirty="0" smtClean="0"/>
-              <a:t>commercial crab yields</a:t>
-            </a:r>
-            <a:r>
-              <a:rPr lang="en-US" dirty="0"/>
+              <a:rPr lang="en-US" sz="2800" dirty="0" smtClean="0"/>
+              <a:t>overall </a:t>
+            </a:r>
+            <a:r>
+              <a:rPr lang="en-US" sz="2800" b="1" dirty="0" smtClean="0"/>
+              <a:t>commercial </a:t>
+            </a:r>
+            <a:r>
+              <a:rPr lang="en-US" sz="2800" b="1" dirty="0" smtClean="0"/>
+              <a:t>crab </a:t>
+            </a:r>
+            <a:r>
+              <a:rPr lang="en-US" sz="2800" b="1" dirty="0" smtClean="0"/>
+              <a:t>yield</a:t>
+            </a:r>
+            <a:r>
+              <a:rPr lang="en-US" sz="2800" dirty="0" smtClean="0"/>
               <a:t>:</a:t>
             </a:r>
-            <a:endParaRPr lang="en-US" dirty="0" smtClean="0"/>
+            <a:endParaRPr lang="en-US" sz="2800" dirty="0" smtClean="0"/>
           </a:p>
           <a:p>
             <a:pPr lvl="1"/>
             <a:r>
-              <a:rPr lang="en-US" dirty="0" smtClean="0"/>
-              <a:t>Protection of incoming or new </a:t>
-            </a:r>
-            <a:r>
-              <a:rPr lang="en-US" b="1" dirty="0" smtClean="0"/>
-              <a:t>fishery recruitment</a:t>
-            </a:r>
-            <a:r>
-              <a:rPr lang="en-US" dirty="0" smtClean="0"/>
+              <a:rPr lang="en-US" sz="2400" dirty="0" smtClean="0"/>
+              <a:t>Protection of </a:t>
+            </a:r>
+            <a:r>
+              <a:rPr lang="en-US" sz="2400" dirty="0"/>
+              <a:t>new </a:t>
+            </a:r>
+            <a:r>
+              <a:rPr lang="en-US" sz="2400" dirty="0" smtClean="0"/>
+              <a:t>or incoming </a:t>
+            </a:r>
+            <a:r>
+              <a:rPr lang="en-US" sz="2400" b="1" dirty="0" smtClean="0"/>
+              <a:t>fishery </a:t>
+            </a:r>
+            <a:r>
+              <a:rPr lang="en-US" sz="2400" b="1" dirty="0" smtClean="0"/>
+              <a:t>recruitment</a:t>
+            </a:r>
+            <a:r>
+              <a:rPr lang="en-US" sz="2400" dirty="0" smtClean="0"/>
               <a:t>.</a:t>
             </a:r>
           </a:p>
           <a:p>
             <a:pPr lvl="1"/>
             <a:r>
-              <a:rPr lang="en-US" dirty="0" smtClean="0"/>
+              <a:rPr lang="en-US" sz="2400" dirty="0" smtClean="0"/>
               <a:t>Maximize </a:t>
             </a:r>
             <a:r>
-              <a:rPr lang="en-US" b="1" dirty="0" smtClean="0"/>
+              <a:rPr lang="en-US" sz="2400" b="1" dirty="0" smtClean="0"/>
               <a:t>future population recruitment</a:t>
             </a:r>
             <a:r>
-              <a:rPr lang="en-US" dirty="0" smtClean="0"/>
+              <a:rPr lang="en-US" sz="2400" dirty="0" smtClean="0"/>
               <a:t>.</a:t>
             </a:r>
           </a:p>
@@ -5188,28 +5230,41 @@
             <a:pPr marL="457200" lvl="1" indent="0">
               <a:buNone/>
             </a:pPr>
-            <a:endParaRPr lang="en-US" dirty="0" smtClean="0"/>
-          </a:p>
-          <a:p>
-            <a:r>
-              <a:rPr lang="en-US" dirty="0" smtClean="0"/>
-              <a:t>Minimize impact of snow crab fishing activities on ecologically important or sensitive species.</a:t>
-            </a:r>
-          </a:p>
-          <a:p>
-            <a:endParaRPr lang="en-US" dirty="0" smtClean="0"/>
-          </a:p>
-          <a:p>
-            <a:r>
-              <a:rPr lang="en-US" dirty="0"/>
+            <a:endParaRPr lang="en-US" sz="2400" dirty="0" smtClean="0"/>
+          </a:p>
+          <a:p>
+            <a:r>
+              <a:rPr lang="en-US" sz="2800" dirty="0" smtClean="0"/>
+              <a:t>Maintain a minimum residual biomass.</a:t>
+            </a:r>
+          </a:p>
+          <a:p>
+            <a:endParaRPr lang="en-US" sz="2800" dirty="0" smtClean="0"/>
+          </a:p>
+          <a:p>
+            <a:r>
+              <a:rPr lang="en-US" sz="2800" dirty="0" smtClean="0"/>
+              <a:t>Minimize impact of snow crab fishing activities on ecologically important or sensitive species</a:t>
+            </a:r>
+            <a:r>
+              <a:rPr lang="en-US" sz="2800" dirty="0" smtClean="0"/>
+              <a:t>.</a:t>
+            </a:r>
+          </a:p>
+          <a:p>
+            <a:endParaRPr lang="en-US" sz="2800" dirty="0" smtClean="0"/>
+          </a:p>
+          <a:p>
+            <a:r>
+              <a:rPr lang="en-US" sz="2800" dirty="0"/>
               <a:t>Foresee and minimize impacts of </a:t>
             </a:r>
             <a:r>
-              <a:rPr lang="en-US" b="1" dirty="0"/>
+              <a:rPr lang="en-US" sz="2800" b="1" dirty="0"/>
               <a:t>climate change</a:t>
             </a:r>
             <a:r>
-              <a:rPr lang="en-US" dirty="0" smtClean="0"/>
+              <a:rPr lang="en-US" sz="2800" dirty="0" smtClean="0"/>
               <a:t>.</a:t>
             </a:r>
           </a:p>
@@ -5425,12 +5480,28 @@
             <p:ph type="title"/>
           </p:nvPr>
         </p:nvSpPr>
-        <p:spPr/>
-        <p:txBody>
-          <a:bodyPr/>
-          <a:lstStyle/>
-          <a:p>
-            <a:endParaRPr lang="en-US"/>
+        <p:spPr>
+          <a:xfrm>
+            <a:off x="457200" y="274638"/>
+            <a:ext cx="8229600" cy="717583"/>
+          </a:xfrm>
+        </p:spPr>
+        <p:txBody>
+          <a:bodyPr>
+            <a:noAutofit/>
+          </a:bodyPr>
+          <a:lstStyle/>
+          <a:p>
+            <a:pPr algn="l"/>
+            <a:r>
+              <a:rPr lang="en-US" sz="3200" b="1" dirty="0" smtClean="0"/>
+              <a:t>Scale differences </a:t>
+            </a:r>
+            <a:r>
+              <a:rPr lang="en-US" sz="3200" b="1" dirty="0" smtClean="0"/>
+              <a:t>between R quantities</a:t>
+            </a:r>
+            <a:endParaRPr lang="en-US" sz="3200" b="1" dirty="0"/>
           </a:p>
         </p:txBody>
       </p:sp>
@@ -5444,12 +5515,218 @@
             <p:ph idx="1"/>
           </p:nvPr>
         </p:nvSpPr>
-        <p:spPr/>
-        <p:txBody>
-          <a:bodyPr/>
-          <a:lstStyle/>
-          <a:p>
-            <a:endParaRPr lang="en-US"/>
+        <p:spPr>
+          <a:xfrm>
+            <a:off x="457200" y="992221"/>
+            <a:ext cx="8229600" cy="5408579"/>
+          </a:xfrm>
+        </p:spPr>
+        <p:txBody>
+          <a:bodyPr>
+            <a:normAutofit fontScale="85000" lnSpcReduction="10000"/>
+          </a:bodyPr>
+          <a:lstStyle/>
+          <a:p>
+            <a:pPr marL="0" indent="0">
+              <a:buNone/>
+            </a:pPr>
+            <a:r>
+              <a:rPr lang="en-CA" dirty="0"/>
+              <a:t>So </a:t>
+            </a:r>
+            <a:r>
+              <a:rPr lang="en-CA" dirty="0" smtClean="0"/>
+              <a:t>the relevant processes here are:</a:t>
+            </a:r>
+          </a:p>
+          <a:p>
+            <a:pPr marL="571500" indent="-514350">
+              <a:buFont typeface="+mj-lt"/>
+              <a:buAutoNum type="arabicPeriod"/>
+            </a:pPr>
+            <a:r>
+              <a:rPr lang="en-CA" dirty="0" smtClean="0"/>
+              <a:t>increasing </a:t>
+            </a:r>
+            <a:r>
+              <a:rPr lang="en-CA" dirty="0"/>
+              <a:t>catchability </a:t>
+            </a:r>
+            <a:r>
+              <a:rPr lang="en-CA" dirty="0" smtClean="0"/>
+              <a:t>of the survey trawl with crab size.</a:t>
+            </a:r>
+          </a:p>
+          <a:p>
+            <a:pPr marL="571500" indent="-514350">
+              <a:buFont typeface="+mj-lt"/>
+              <a:buAutoNum type="arabicPeriod"/>
+            </a:pPr>
+            <a:r>
+              <a:rPr lang="en-CA" dirty="0" smtClean="0"/>
+              <a:t>Defining R’s using size ranges derived from a deterministic growth model is failing in some way the true quantities of R-4, R-3 </a:t>
+            </a:r>
+            <a:r>
+              <a:rPr lang="en-CA" dirty="0" err="1" smtClean="0"/>
+              <a:t>etc</a:t>
+            </a:r>
+            <a:r>
+              <a:rPr lang="en-CA" dirty="0" smtClean="0"/>
+              <a:t> …</a:t>
+            </a:r>
+          </a:p>
+          <a:p>
+            <a:pPr marL="571500" indent="-514350">
+              <a:buFont typeface="+mj-lt"/>
+              <a:buAutoNum type="arabicPeriod"/>
+            </a:pPr>
+            <a:r>
+              <a:rPr lang="fr-CA" dirty="0" err="1" smtClean="0"/>
+              <a:t>Annual</a:t>
+            </a:r>
+            <a:r>
+              <a:rPr lang="fr-CA" dirty="0" smtClean="0"/>
+              <a:t> variation in skip-</a:t>
+            </a:r>
+            <a:r>
+              <a:rPr lang="fr-CA" dirty="0" err="1" smtClean="0"/>
+              <a:t>moulters</a:t>
+            </a:r>
+            <a:r>
+              <a:rPr lang="fr-CA" dirty="0" smtClean="0"/>
+              <a:t> </a:t>
+            </a:r>
+            <a:r>
+              <a:rPr lang="fr-CA" dirty="0" err="1" smtClean="0"/>
+              <a:t>is</a:t>
+            </a:r>
+            <a:r>
+              <a:rPr lang="fr-CA" dirty="0" smtClean="0"/>
+              <a:t> </a:t>
+            </a:r>
+            <a:r>
+              <a:rPr lang="fr-CA" dirty="0" err="1" smtClean="0"/>
+              <a:t>skewing</a:t>
+            </a:r>
+            <a:r>
+              <a:rPr lang="fr-CA" dirty="0" smtClean="0"/>
+              <a:t> </a:t>
+            </a:r>
+            <a:r>
+              <a:rPr lang="fr-CA" dirty="0" err="1" smtClean="0"/>
+              <a:t>predictions</a:t>
+            </a:r>
+            <a:r>
+              <a:rPr lang="fr-CA" dirty="0" smtClean="0"/>
+              <a:t> back and </a:t>
+            </a:r>
+            <a:r>
+              <a:rPr lang="fr-CA" dirty="0" err="1" smtClean="0"/>
+              <a:t>forth</a:t>
+            </a:r>
+            <a:r>
+              <a:rPr lang="fr-CA" dirty="0" smtClean="0"/>
+              <a:t>.</a:t>
+            </a:r>
+          </a:p>
+          <a:p>
+            <a:pPr marL="571500" indent="-514350">
+              <a:buFont typeface="+mj-lt"/>
+              <a:buAutoNum type="arabicPeriod"/>
+            </a:pPr>
+            <a:r>
+              <a:rPr lang="fr-CA" dirty="0" smtClean="0"/>
+              <a:t>R-1s have identification issues (i.e. </a:t>
+            </a:r>
+            <a:r>
+              <a:rPr lang="fr-CA" dirty="0" err="1" smtClean="0"/>
+              <a:t>misattributed</a:t>
+            </a:r>
+            <a:r>
+              <a:rPr lang="fr-CA" dirty="0" smtClean="0"/>
+              <a:t> </a:t>
+            </a:r>
+            <a:r>
+              <a:rPr lang="fr-CA" dirty="0" err="1" smtClean="0"/>
+              <a:t>shell</a:t>
+            </a:r>
+            <a:r>
+              <a:rPr lang="fr-CA" dirty="0" smtClean="0"/>
+              <a:t> conditions) in certain </a:t>
+            </a:r>
+            <a:r>
+              <a:rPr lang="fr-CA" dirty="0" err="1" smtClean="0"/>
+              <a:t>years</a:t>
+            </a:r>
+            <a:r>
+              <a:rPr lang="fr-CA" dirty="0"/>
+              <a:t> </a:t>
+            </a:r>
+            <a:r>
+              <a:rPr lang="fr-CA" dirty="0" smtClean="0"/>
+              <a:t>(</a:t>
+            </a:r>
+            <a:r>
+              <a:rPr lang="fr-CA" dirty="0" err="1" smtClean="0"/>
+              <a:t>e.g</a:t>
+            </a:r>
+            <a:r>
+              <a:rPr lang="fr-CA" dirty="0" smtClean="0"/>
+              <a:t>. 2010 and 2018).</a:t>
+            </a:r>
+          </a:p>
+          <a:p>
+            <a:pPr marL="571500" indent="-514350">
+              <a:buFont typeface="+mj-lt"/>
+              <a:buAutoNum type="arabicPeriod"/>
+            </a:pPr>
+            <a:r>
+              <a:rPr lang="fr-CA" dirty="0" err="1" smtClean="0"/>
+              <a:t>Vessel</a:t>
+            </a:r>
+            <a:r>
+              <a:rPr lang="fr-CA" dirty="0" smtClean="0"/>
+              <a:t> change in </a:t>
+            </a:r>
+            <a:r>
+              <a:rPr lang="fr-CA" dirty="0" err="1" smtClean="0"/>
+              <a:t>catchability</a:t>
+            </a:r>
+            <a:r>
+              <a:rPr lang="fr-CA" dirty="0" smtClean="0"/>
+              <a:t>.</a:t>
+            </a:r>
+          </a:p>
+          <a:p>
+            <a:pPr marL="571500" indent="-514350">
+              <a:buFont typeface="+mj-lt"/>
+              <a:buAutoNum type="arabicPeriod"/>
+            </a:pPr>
+            <a:r>
+              <a:rPr lang="fr-CA" dirty="0" err="1" smtClean="0"/>
+              <a:t>Increasing</a:t>
+            </a:r>
+            <a:r>
+              <a:rPr lang="fr-CA" dirty="0" smtClean="0"/>
+              <a:t> </a:t>
+            </a:r>
+            <a:r>
+              <a:rPr lang="fr-CA" dirty="0" err="1" smtClean="0"/>
+              <a:t>catchability</a:t>
+            </a:r>
+            <a:r>
+              <a:rPr lang="fr-CA" dirty="0" smtClean="0"/>
+              <a:t> </a:t>
+            </a:r>
+            <a:r>
+              <a:rPr lang="fr-CA" dirty="0" err="1" smtClean="0"/>
+              <a:t>through</a:t>
+            </a:r>
+            <a:r>
+              <a:rPr lang="fr-CA" dirty="0" smtClean="0"/>
+              <a:t> station relocations.</a:t>
+            </a:r>
+            <a:endParaRPr lang="en-US" dirty="0"/>
           </a:p>
         </p:txBody>
       </p:sp>

</xml_diff>